<commit_message>
Improved summary texts on power point
Made person-tense consistent to 3rd person. Added some more narration.
</commit_message>
<xml_diff>
--- a/done parts.pptx
+++ b/done parts.pptx
@@ -248,7 +248,7 @@
           <a:p>
             <a:fld id="{4BB7BF7A-05F6-459F-9B84-30CD87B54E44}" type="datetimeFigureOut">
               <a:rPr lang="en-US" smtClean="0"/>
-              <a:t>4/11/2015</a:t>
+              <a:t>4/13/2015</a:t>
             </a:fld>
             <a:endParaRPr lang="en-US"/>
           </a:p>
@@ -290,7 +290,7 @@
           <a:p>
             <a:fld id="{272B8725-E8D3-4A93-B944-E12BD5AD8471}" type="slidenum">
               <a:rPr lang="en-US" smtClean="0"/>
-              <a:t>‹nº›</a:t>
+              <a:t>‹#›</a:t>
             </a:fld>
             <a:endParaRPr lang="en-US"/>
           </a:p>
@@ -418,7 +418,7 @@
           <a:p>
             <a:fld id="{4BB7BF7A-05F6-459F-9B84-30CD87B54E44}" type="datetimeFigureOut">
               <a:rPr lang="en-US" smtClean="0"/>
-              <a:t>4/11/2015</a:t>
+              <a:t>4/13/2015</a:t>
             </a:fld>
             <a:endParaRPr lang="en-US"/>
           </a:p>
@@ -460,7 +460,7 @@
           <a:p>
             <a:fld id="{272B8725-E8D3-4A93-B944-E12BD5AD8471}" type="slidenum">
               <a:rPr lang="en-US" smtClean="0"/>
-              <a:t>‹nº›</a:t>
+              <a:t>‹#›</a:t>
             </a:fld>
             <a:endParaRPr lang="en-US"/>
           </a:p>
@@ -598,7 +598,7 @@
           <a:p>
             <a:fld id="{4BB7BF7A-05F6-459F-9B84-30CD87B54E44}" type="datetimeFigureOut">
               <a:rPr lang="en-US" smtClean="0"/>
-              <a:t>4/11/2015</a:t>
+              <a:t>4/13/2015</a:t>
             </a:fld>
             <a:endParaRPr lang="en-US"/>
           </a:p>
@@ -640,7 +640,7 @@
           <a:p>
             <a:fld id="{272B8725-E8D3-4A93-B944-E12BD5AD8471}" type="slidenum">
               <a:rPr lang="en-US" smtClean="0"/>
-              <a:t>‹nº›</a:t>
+              <a:t>‹#›</a:t>
             </a:fld>
             <a:endParaRPr lang="en-US"/>
           </a:p>
@@ -768,7 +768,7 @@
           <a:p>
             <a:fld id="{4BB7BF7A-05F6-459F-9B84-30CD87B54E44}" type="datetimeFigureOut">
               <a:rPr lang="en-US" smtClean="0"/>
-              <a:t>4/11/2015</a:t>
+              <a:t>4/13/2015</a:t>
             </a:fld>
             <a:endParaRPr lang="en-US"/>
           </a:p>
@@ -810,7 +810,7 @@
           <a:p>
             <a:fld id="{272B8725-E8D3-4A93-B944-E12BD5AD8471}" type="slidenum">
               <a:rPr lang="en-US" smtClean="0"/>
-              <a:t>‹nº›</a:t>
+              <a:t>‹#›</a:t>
             </a:fld>
             <a:endParaRPr lang="en-US"/>
           </a:p>
@@ -1014,7 +1014,7 @@
           <a:p>
             <a:fld id="{4BB7BF7A-05F6-459F-9B84-30CD87B54E44}" type="datetimeFigureOut">
               <a:rPr lang="en-US" smtClean="0"/>
-              <a:t>4/11/2015</a:t>
+              <a:t>4/13/2015</a:t>
             </a:fld>
             <a:endParaRPr lang="en-US"/>
           </a:p>
@@ -1056,7 +1056,7 @@
           <a:p>
             <a:fld id="{272B8725-E8D3-4A93-B944-E12BD5AD8471}" type="slidenum">
               <a:rPr lang="en-US" smtClean="0"/>
-              <a:t>‹nº›</a:t>
+              <a:t>‹#›</a:t>
             </a:fld>
             <a:endParaRPr lang="en-US"/>
           </a:p>
@@ -1246,7 +1246,7 @@
           <a:p>
             <a:fld id="{4BB7BF7A-05F6-459F-9B84-30CD87B54E44}" type="datetimeFigureOut">
               <a:rPr lang="en-US" smtClean="0"/>
-              <a:t>4/11/2015</a:t>
+              <a:t>4/13/2015</a:t>
             </a:fld>
             <a:endParaRPr lang="en-US"/>
           </a:p>
@@ -1288,7 +1288,7 @@
           <a:p>
             <a:fld id="{272B8725-E8D3-4A93-B944-E12BD5AD8471}" type="slidenum">
               <a:rPr lang="en-US" smtClean="0"/>
-              <a:t>‹nº›</a:t>
+              <a:t>‹#›</a:t>
             </a:fld>
             <a:endParaRPr lang="en-US"/>
           </a:p>
@@ -1613,7 +1613,7 @@
           <a:p>
             <a:fld id="{4BB7BF7A-05F6-459F-9B84-30CD87B54E44}" type="datetimeFigureOut">
               <a:rPr lang="en-US" smtClean="0"/>
-              <a:t>4/11/2015</a:t>
+              <a:t>4/13/2015</a:t>
             </a:fld>
             <a:endParaRPr lang="en-US"/>
           </a:p>
@@ -1655,7 +1655,7 @@
           <a:p>
             <a:fld id="{272B8725-E8D3-4A93-B944-E12BD5AD8471}" type="slidenum">
               <a:rPr lang="en-US" smtClean="0"/>
-              <a:t>‹nº›</a:t>
+              <a:t>‹#›</a:t>
             </a:fld>
             <a:endParaRPr lang="en-US"/>
           </a:p>
@@ -1731,7 +1731,7 @@
           <a:p>
             <a:fld id="{4BB7BF7A-05F6-459F-9B84-30CD87B54E44}" type="datetimeFigureOut">
               <a:rPr lang="en-US" smtClean="0"/>
-              <a:t>4/11/2015</a:t>
+              <a:t>4/13/2015</a:t>
             </a:fld>
             <a:endParaRPr lang="en-US"/>
           </a:p>
@@ -1773,7 +1773,7 @@
           <a:p>
             <a:fld id="{272B8725-E8D3-4A93-B944-E12BD5AD8471}" type="slidenum">
               <a:rPr lang="en-US" smtClean="0"/>
-              <a:t>‹nº›</a:t>
+              <a:t>‹#›</a:t>
             </a:fld>
             <a:endParaRPr lang="en-US"/>
           </a:p>
@@ -1826,7 +1826,7 @@
           <a:p>
             <a:fld id="{4BB7BF7A-05F6-459F-9B84-30CD87B54E44}" type="datetimeFigureOut">
               <a:rPr lang="en-US" smtClean="0"/>
-              <a:t>4/11/2015</a:t>
+              <a:t>4/13/2015</a:t>
             </a:fld>
             <a:endParaRPr lang="en-US"/>
           </a:p>
@@ -1868,7 +1868,7 @@
           <a:p>
             <a:fld id="{272B8725-E8D3-4A93-B944-E12BD5AD8471}" type="slidenum">
               <a:rPr lang="en-US" smtClean="0"/>
-              <a:t>‹nº›</a:t>
+              <a:t>‹#›</a:t>
             </a:fld>
             <a:endParaRPr lang="en-US"/>
           </a:p>
@@ -2103,7 +2103,7 @@
           <a:p>
             <a:fld id="{4BB7BF7A-05F6-459F-9B84-30CD87B54E44}" type="datetimeFigureOut">
               <a:rPr lang="en-US" smtClean="0"/>
-              <a:t>4/11/2015</a:t>
+              <a:t>4/13/2015</a:t>
             </a:fld>
             <a:endParaRPr lang="en-US"/>
           </a:p>
@@ -2145,7 +2145,7 @@
           <a:p>
             <a:fld id="{272B8725-E8D3-4A93-B944-E12BD5AD8471}" type="slidenum">
               <a:rPr lang="en-US" smtClean="0"/>
-              <a:t>‹nº›</a:t>
+              <a:t>‹#›</a:t>
             </a:fld>
             <a:endParaRPr lang="en-US"/>
           </a:p>
@@ -2356,7 +2356,7 @@
           <a:p>
             <a:fld id="{4BB7BF7A-05F6-459F-9B84-30CD87B54E44}" type="datetimeFigureOut">
               <a:rPr lang="en-US" smtClean="0"/>
-              <a:t>4/11/2015</a:t>
+              <a:t>4/13/2015</a:t>
             </a:fld>
             <a:endParaRPr lang="en-US"/>
           </a:p>
@@ -2398,7 +2398,7 @@
           <a:p>
             <a:fld id="{272B8725-E8D3-4A93-B944-E12BD5AD8471}" type="slidenum">
               <a:rPr lang="en-US" smtClean="0"/>
-              <a:t>‹nº›</a:t>
+              <a:t>‹#›</a:t>
             </a:fld>
             <a:endParaRPr lang="en-US"/>
           </a:p>
@@ -2569,7 +2569,7 @@
           <a:p>
             <a:fld id="{4BB7BF7A-05F6-459F-9B84-30CD87B54E44}" type="datetimeFigureOut">
               <a:rPr lang="en-US" smtClean="0"/>
-              <a:t>4/11/2015</a:t>
+              <a:t>4/13/2015</a:t>
             </a:fld>
             <a:endParaRPr lang="en-US"/>
           </a:p>
@@ -2647,7 +2647,7 @@
           <a:p>
             <a:fld id="{272B8725-E8D3-4A93-B944-E12BD5AD8471}" type="slidenum">
               <a:rPr lang="en-US" smtClean="0"/>
-              <a:t>‹nº›</a:t>
+              <a:t>‹#›</a:t>
             </a:fld>
             <a:endParaRPr lang="en-US"/>
           </a:p>
@@ -3045,7 +3045,7 @@
         <p:spPr>
           <a:xfrm>
             <a:off x="8332631" y="4790941"/>
-            <a:ext cx="2149499" cy="369332"/>
+            <a:ext cx="1535805" cy="369332"/>
           </a:xfrm>
           <a:prstGeom prst="rect">
             <a:avLst/>
@@ -3059,29 +3059,26 @@
           <a:lstStyle/>
           <a:p>
             <a:r>
-              <a:rPr lang="en-US" dirty="0" smtClean="0">
+              <a:rPr lang="en-US" b="1" dirty="0" err="1" smtClean="0">
                 <a:solidFill>
                   <a:srgbClr val="FF0000"/>
                 </a:solidFill>
               </a:rPr>
-              <a:t>“</a:t>
-            </a:r>
-            <a:r>
-              <a:rPr lang="en-US" dirty="0" err="1" smtClean="0">
+              <a:t>Fellipe</a:t>
+            </a:r>
+            <a:r>
+              <a:rPr lang="en-US" b="1" dirty="0" smtClean="0">
                 <a:solidFill>
                   <a:srgbClr val="FF0000"/>
                 </a:solidFill>
               </a:rPr>
-              <a:t>fellipe</a:t>
-            </a:r>
-            <a:r>
-              <a:rPr lang="en-US" dirty="0" smtClean="0">
-                <a:solidFill>
-                  <a:srgbClr val="FF0000"/>
-                </a:solidFill>
-              </a:rPr>
-              <a:t>” a supervisor</a:t>
-            </a:r>
+              <a:t> logs in.</a:t>
+            </a:r>
+            <a:endParaRPr lang="en-US" b="1" dirty="0" smtClean="0">
+              <a:solidFill>
+                <a:srgbClr val="FF0000"/>
+              </a:solidFill>
+            </a:endParaRPr>
           </a:p>
         </p:txBody>
       </p:sp>
@@ -3192,8 +3189,8 @@
         </p:nvSpPr>
         <p:spPr>
           <a:xfrm>
-            <a:off x="1490850" y="2284413"/>
-            <a:ext cx="3468642" cy="369332"/>
+            <a:off x="3212747" y="2515259"/>
+            <a:ext cx="8979253" cy="369332"/>
           </a:xfrm>
           <a:prstGeom prst="rect">
             <a:avLst/>
@@ -3212,7 +3209,31 @@
                   <a:srgbClr val="FF0000"/>
                 </a:solidFill>
               </a:rPr>
-              <a:t>I clicked on “Create new Account”</a:t>
+              <a:t>Luke clicks</a:t>
+            </a:r>
+            <a:r>
+              <a:rPr lang="en-US" b="1" dirty="0" smtClean="0">
+                <a:solidFill>
+                  <a:srgbClr val="FF0000"/>
+                </a:solidFill>
+              </a:rPr>
+              <a:t> </a:t>
+            </a:r>
+            <a:r>
+              <a:rPr lang="en-US" b="1" dirty="0" smtClean="0">
+                <a:solidFill>
+                  <a:srgbClr val="FF0000"/>
+                </a:solidFill>
+              </a:rPr>
+              <a:t>on “Create new </a:t>
+            </a:r>
+            <a:r>
+              <a:rPr lang="en-US" b="1" dirty="0" smtClean="0">
+                <a:solidFill>
+                  <a:srgbClr val="FF0000"/>
+                </a:solidFill>
+              </a:rPr>
+              <a:t>Account.” Now he can add a new employee, supervisor, or admin</a:t>
             </a:r>
             <a:endParaRPr lang="en-US" b="1" dirty="0">
               <a:solidFill>
@@ -3321,6 +3342,44 @@
           </a:prstGeom>
         </p:spPr>
       </p:pic>
+      <p:sp>
+        <p:nvSpPr>
+          <p:cNvPr id="5" name="CaixaDeTexto 4"/>
+          <p:cNvSpPr txBox="1"/>
+          <p:nvPr/>
+        </p:nvSpPr>
+        <p:spPr>
+          <a:xfrm>
+            <a:off x="1326523" y="5267459"/>
+            <a:ext cx="4143570" cy="369332"/>
+          </a:xfrm>
+          <a:prstGeom prst="rect">
+            <a:avLst/>
+          </a:prstGeom>
+          <a:noFill/>
+        </p:spPr>
+        <p:txBody>
+          <a:bodyPr wrap="none" rtlCol="0">
+            <a:spAutoFit/>
+          </a:bodyPr>
+          <a:lstStyle/>
+          <a:p>
+            <a:r>
+              <a:rPr lang="en-US" b="1" dirty="0" smtClean="0">
+                <a:solidFill>
+                  <a:srgbClr val="FF0000"/>
+                </a:solidFill>
+              </a:rPr>
+              <a:t>Confirmation page tells Luke it succeeded</a:t>
+            </a:r>
+            <a:endParaRPr lang="en-US" b="1" dirty="0" smtClean="0">
+              <a:solidFill>
+                <a:srgbClr val="FF0000"/>
+              </a:solidFill>
+            </a:endParaRPr>
+          </a:p>
+        </p:txBody>
+      </p:sp>
     </p:spTree>
     <p:extLst>
       <p:ext uri="{BB962C8B-B14F-4D97-AF65-F5344CB8AC3E}">
@@ -3384,44 +3443,6 @@
       </p:pic>
       <p:sp>
         <p:nvSpPr>
-          <p:cNvPr id="2" name="Título 1"/>
-          <p:cNvSpPr>
-            <a:spLocks noGrp="1"/>
-          </p:cNvSpPr>
-          <p:nvPr>
-            <p:ph type="title"/>
-          </p:nvPr>
-        </p:nvSpPr>
-        <p:spPr/>
-        <p:txBody>
-          <a:bodyPr/>
-          <a:lstStyle/>
-          <a:p>
-            <a:endParaRPr lang="en-US"/>
-          </a:p>
-        </p:txBody>
-      </p:sp>
-      <p:sp>
-        <p:nvSpPr>
-          <p:cNvPr id="3" name="Espaço Reservado para Conteúdo 2"/>
-          <p:cNvSpPr>
-            <a:spLocks noGrp="1"/>
-          </p:cNvSpPr>
-          <p:nvPr>
-            <p:ph idx="1"/>
-          </p:nvPr>
-        </p:nvSpPr>
-        <p:spPr/>
-        <p:txBody>
-          <a:bodyPr/>
-          <a:lstStyle/>
-          <a:p>
-            <a:endParaRPr lang="en-US"/>
-          </a:p>
-        </p:txBody>
-      </p:sp>
-      <p:sp>
-        <p:nvSpPr>
           <p:cNvPr id="5" name="CaixaDeTexto 4"/>
           <p:cNvSpPr txBox="1"/>
           <p:nvPr/>
@@ -3519,6 +3540,52 @@
               <a:t>Only the supervisor can see this</a:t>
             </a:r>
             <a:endParaRPr lang="en-US" b="1" dirty="0">
+              <a:solidFill>
+                <a:srgbClr val="FF0000"/>
+              </a:solidFill>
+            </a:endParaRPr>
+          </a:p>
+        </p:txBody>
+      </p:sp>
+      <p:sp>
+        <p:nvSpPr>
+          <p:cNvPr id="8" name="CaixaDeTexto 4"/>
+          <p:cNvSpPr txBox="1"/>
+          <p:nvPr/>
+        </p:nvSpPr>
+        <p:spPr>
+          <a:xfrm>
+            <a:off x="3348507" y="3738910"/>
+            <a:ext cx="2228752" cy="369332"/>
+          </a:xfrm>
+          <a:prstGeom prst="rect">
+            <a:avLst/>
+          </a:prstGeom>
+          <a:noFill/>
+        </p:spPr>
+        <p:txBody>
+          <a:bodyPr wrap="none" rtlCol="0">
+            <a:spAutoFit/>
+          </a:bodyPr>
+          <a:lstStyle/>
+          <a:p>
+            <a:r>
+              <a:rPr lang="en-US" b="1" dirty="0" err="1" smtClean="0">
+                <a:solidFill>
+                  <a:srgbClr val="FF0000"/>
+                </a:solidFill>
+              </a:rPr>
+              <a:t>Fellipe</a:t>
+            </a:r>
+            <a:r>
+              <a:rPr lang="en-US" b="1" dirty="0" smtClean="0">
+                <a:solidFill>
+                  <a:srgbClr val="FF0000"/>
+                </a:solidFill>
+              </a:rPr>
+              <a:t> is a supervisor</a:t>
+            </a:r>
+            <a:endParaRPr lang="en-US" b="1" dirty="0" smtClean="0">
               <a:solidFill>
                 <a:srgbClr val="FF0000"/>
               </a:solidFill>
@@ -3634,7 +3701,7 @@
         <p:spPr>
           <a:xfrm>
             <a:off x="1326523" y="5267459"/>
-            <a:ext cx="7442294" cy="369332"/>
+            <a:ext cx="6310254" cy="369332"/>
           </a:xfrm>
           <a:prstGeom prst="rect">
             <a:avLst/>
@@ -3653,7 +3720,47 @@
                   <a:srgbClr val="FF0000"/>
                 </a:solidFill>
               </a:rPr>
-              <a:t>Need to add the option the insert the employees participating in the project</a:t>
+              <a:t>Not yet implemented: </a:t>
+            </a:r>
+            <a:r>
+              <a:rPr lang="en-US" b="1" dirty="0" smtClean="0">
+                <a:solidFill>
+                  <a:srgbClr val="FF0000"/>
+                </a:solidFill>
+              </a:rPr>
+              <a:t>list the</a:t>
+            </a:r>
+            <a:r>
+              <a:rPr lang="en-US" b="1" dirty="0" smtClean="0">
+                <a:solidFill>
+                  <a:srgbClr val="FF0000"/>
+                </a:solidFill>
+              </a:rPr>
+              <a:t> </a:t>
+            </a:r>
+            <a:r>
+              <a:rPr lang="en-US" b="1" dirty="0" smtClean="0">
+                <a:solidFill>
+                  <a:srgbClr val="FF0000"/>
+                </a:solidFill>
+              </a:rPr>
+              <a:t>employees </a:t>
+            </a:r>
+            <a:r>
+              <a:rPr lang="en-US" b="1" dirty="0" smtClean="0">
+                <a:solidFill>
+                  <a:srgbClr val="FF0000"/>
+                </a:solidFill>
+              </a:rPr>
+              <a:t>working on </a:t>
+            </a:r>
+            <a:r>
+              <a:rPr lang="en-US" b="1" dirty="0" smtClean="0">
+                <a:solidFill>
+                  <a:srgbClr val="FF0000"/>
+                </a:solidFill>
+              </a:rPr>
+              <a:t>the project</a:t>
             </a:r>
           </a:p>
         </p:txBody>
@@ -3798,6 +3905,52 @@
           </a:p>
         </p:txBody>
       </p:sp>
+      <p:sp>
+        <p:nvSpPr>
+          <p:cNvPr id="6" name="CaixaDeTexto 4"/>
+          <p:cNvSpPr txBox="1"/>
+          <p:nvPr/>
+        </p:nvSpPr>
+        <p:spPr>
+          <a:xfrm>
+            <a:off x="3132065" y="5591573"/>
+            <a:ext cx="2015295" cy="369332"/>
+          </a:xfrm>
+          <a:prstGeom prst="rect">
+            <a:avLst/>
+          </a:prstGeom>
+          <a:noFill/>
+        </p:spPr>
+        <p:txBody>
+          <a:bodyPr wrap="none" rtlCol="0">
+            <a:spAutoFit/>
+          </a:bodyPr>
+          <a:lstStyle/>
+          <a:p>
+            <a:r>
+              <a:rPr lang="en-US" b="1" dirty="0" err="1" smtClean="0">
+                <a:solidFill>
+                  <a:srgbClr val="FF0000"/>
+                </a:solidFill>
+              </a:rPr>
+              <a:t>Fellipe</a:t>
+            </a:r>
+            <a:r>
+              <a:rPr lang="en-US" b="1" dirty="0" smtClean="0">
+                <a:solidFill>
+                  <a:srgbClr val="FF0000"/>
+                </a:solidFill>
+              </a:rPr>
+              <a:t> clicks create</a:t>
+            </a:r>
+            <a:endParaRPr lang="en-US" b="1" dirty="0" smtClean="0">
+              <a:solidFill>
+                <a:srgbClr val="FF0000"/>
+              </a:solidFill>
+            </a:endParaRPr>
+          </a:p>
+        </p:txBody>
+      </p:sp>
     </p:spTree>
     <p:extLst>
       <p:ext uri="{BB962C8B-B14F-4D97-AF65-F5344CB8AC3E}">
@@ -3897,6 +4050,60 @@
           </a:prstGeom>
         </p:spPr>
       </p:pic>
+      <p:sp>
+        <p:nvSpPr>
+          <p:cNvPr id="5" name="CaixaDeTexto 4"/>
+          <p:cNvSpPr txBox="1"/>
+          <p:nvPr/>
+        </p:nvSpPr>
+        <p:spPr>
+          <a:xfrm>
+            <a:off x="1326523" y="5267459"/>
+            <a:ext cx="4327595" cy="369332"/>
+          </a:xfrm>
+          <a:prstGeom prst="rect">
+            <a:avLst/>
+          </a:prstGeom>
+          <a:noFill/>
+        </p:spPr>
+        <p:txBody>
+          <a:bodyPr wrap="none" rtlCol="0">
+            <a:spAutoFit/>
+          </a:bodyPr>
+          <a:lstStyle/>
+          <a:p>
+            <a:r>
+              <a:rPr lang="en-US" b="1" dirty="0" smtClean="0">
+                <a:solidFill>
+                  <a:srgbClr val="FF0000"/>
+                </a:solidFill>
+              </a:rPr>
+              <a:t>Confirmation page tells </a:t>
+            </a:r>
+            <a:r>
+              <a:rPr lang="en-US" b="1" dirty="0" err="1" smtClean="0">
+                <a:solidFill>
+                  <a:srgbClr val="FF0000"/>
+                </a:solidFill>
+              </a:rPr>
+              <a:t>Fellipe</a:t>
+            </a:r>
+            <a:r>
+              <a:rPr lang="en-US" b="1" dirty="0" smtClean="0">
+                <a:solidFill>
+                  <a:srgbClr val="FF0000"/>
+                </a:solidFill>
+              </a:rPr>
+              <a:t> it succeeded</a:t>
+            </a:r>
+            <a:endParaRPr lang="en-US" b="1" dirty="0" smtClean="0">
+              <a:solidFill>
+                <a:srgbClr val="FF0000"/>
+              </a:solidFill>
+            </a:endParaRPr>
+          </a:p>
+        </p:txBody>
+      </p:sp>
     </p:spTree>
     <p:extLst>
       <p:ext uri="{BB962C8B-B14F-4D97-AF65-F5344CB8AC3E}">
@@ -4005,7 +4212,7 @@
         <p:spPr>
           <a:xfrm>
             <a:off x="8075054" y="4984124"/>
-            <a:ext cx="1975349" cy="369332"/>
+            <a:ext cx="1351780" cy="369332"/>
           </a:xfrm>
           <a:prstGeom prst="rect">
             <a:avLst/>
@@ -4024,8 +4231,21 @@
                   <a:srgbClr val="FF0000"/>
                 </a:solidFill>
               </a:rPr>
-              <a:t>“Luke” is an admin</a:t>
-            </a:r>
+              <a:t>Luke </a:t>
+            </a:r>
+            <a:r>
+              <a:rPr lang="en-US" b="1" dirty="0" smtClean="0">
+                <a:solidFill>
+                  <a:srgbClr val="FF0000"/>
+                </a:solidFill>
+              </a:rPr>
+              <a:t>logs in.</a:t>
+            </a:r>
+            <a:endParaRPr lang="en-US" b="1" dirty="0" smtClean="0">
+              <a:solidFill>
+                <a:srgbClr val="FF0000"/>
+              </a:solidFill>
+            </a:endParaRPr>
           </a:p>
         </p:txBody>
       </p:sp>
@@ -4128,6 +4348,82 @@
           </a:prstGeom>
         </p:spPr>
       </p:pic>
+      <p:sp>
+        <p:nvSpPr>
+          <p:cNvPr id="5" name="CaixaDeTexto 4"/>
+          <p:cNvSpPr txBox="1"/>
+          <p:nvPr/>
+        </p:nvSpPr>
+        <p:spPr>
+          <a:xfrm>
+            <a:off x="3551108" y="5082793"/>
+            <a:ext cx="5911490" cy="369332"/>
+          </a:xfrm>
+          <a:prstGeom prst="rect">
+            <a:avLst/>
+          </a:prstGeom>
+          <a:noFill/>
+        </p:spPr>
+        <p:txBody>
+          <a:bodyPr wrap="none" rtlCol="0">
+            <a:spAutoFit/>
+          </a:bodyPr>
+          <a:lstStyle/>
+          <a:p>
+            <a:r>
+              <a:rPr lang="en-US" b="1" dirty="0" smtClean="0">
+                <a:solidFill>
+                  <a:srgbClr val="FF0000"/>
+                </a:solidFill>
+              </a:rPr>
+              <a:t>Luke can manage projects and accounts from his home page</a:t>
+            </a:r>
+            <a:endParaRPr lang="en-US" b="1" dirty="0" smtClean="0">
+              <a:solidFill>
+                <a:srgbClr val="FF0000"/>
+              </a:solidFill>
+            </a:endParaRPr>
+          </a:p>
+        </p:txBody>
+      </p:sp>
+      <p:sp>
+        <p:nvSpPr>
+          <p:cNvPr id="6" name="CaixaDeTexto 4"/>
+          <p:cNvSpPr txBox="1"/>
+          <p:nvPr/>
+        </p:nvSpPr>
+        <p:spPr>
+          <a:xfrm>
+            <a:off x="6901346" y="3429000"/>
+            <a:ext cx="1773371" cy="369332"/>
+          </a:xfrm>
+          <a:prstGeom prst="rect">
+            <a:avLst/>
+          </a:prstGeom>
+          <a:noFill/>
+        </p:spPr>
+        <p:txBody>
+          <a:bodyPr wrap="none" rtlCol="0">
+            <a:spAutoFit/>
+          </a:bodyPr>
+          <a:lstStyle/>
+          <a:p>
+            <a:r>
+              <a:rPr lang="en-US" b="1" dirty="0" smtClean="0">
+                <a:solidFill>
+                  <a:srgbClr val="FF0000"/>
+                </a:solidFill>
+              </a:rPr>
+              <a:t>Luke is an admin</a:t>
+            </a:r>
+            <a:endParaRPr lang="en-US" b="1" dirty="0" smtClean="0">
+              <a:solidFill>
+                <a:srgbClr val="FF0000"/>
+              </a:solidFill>
+            </a:endParaRPr>
+          </a:p>
+        </p:txBody>
+      </p:sp>
     </p:spTree>
     <p:extLst>
       <p:ext uri="{BB962C8B-B14F-4D97-AF65-F5344CB8AC3E}">
@@ -4236,7 +4532,7 @@
         <p:spPr>
           <a:xfrm>
             <a:off x="4234050" y="3334486"/>
-            <a:ext cx="3149837" cy="369332"/>
+            <a:ext cx="3277629" cy="369332"/>
           </a:xfrm>
           <a:prstGeom prst="rect">
             <a:avLst/>
@@ -4255,7 +4551,23 @@
                   <a:srgbClr val="FF0000"/>
                 </a:solidFill>
               </a:rPr>
-              <a:t>I clicked on “Manage Projects”</a:t>
+              <a:t>He clicks </a:t>
+            </a:r>
+            <a:r>
+              <a:rPr lang="en-US" b="1" dirty="0" smtClean="0">
+                <a:solidFill>
+                  <a:srgbClr val="FF0000"/>
+                </a:solidFill>
+              </a:rPr>
+              <a:t>on </a:t>
+            </a:r>
+            <a:r>
+              <a:rPr lang="en-US" b="1" dirty="0" smtClean="0">
+                <a:solidFill>
+                  <a:srgbClr val="FF0000"/>
+                </a:solidFill>
+              </a:rPr>
+              <a:t>“Manage Projects”</a:t>
             </a:r>
             <a:endParaRPr lang="en-US" b="1" dirty="0">
               <a:solidFill>
@@ -4274,7 +4586,7 @@
         <p:spPr>
           <a:xfrm>
             <a:off x="2820473" y="4752304"/>
-            <a:ext cx="4936801" cy="369332"/>
+            <a:ext cx="6823406" cy="369332"/>
           </a:xfrm>
           <a:prstGeom prst="rect">
             <a:avLst/>
@@ -4292,27 +4604,13 @@
                 <a:solidFill>
                   <a:srgbClr val="FF0000"/>
                 </a:solidFill>
-                <a:effectLst>
-                  <a:outerShdw blurRad="38100" dist="38100" dir="2700000" algn="tl">
-                    <a:srgbClr val="000000">
-                      <a:alpha val="43137"/>
-                    </a:srgbClr>
-                  </a:outerShdw>
-                </a:effectLst>
               </a:rPr>
-              <a:t>Missing: after click in a name, go a editable profile</a:t>
+              <a:t>Not yet implemented: clicking on a project goes to a project edit page</a:t>
             </a:r>
             <a:endParaRPr lang="en-US" b="1" dirty="0">
               <a:solidFill>
                 <a:srgbClr val="FF0000"/>
               </a:solidFill>
-              <a:effectLst>
-                <a:outerShdw blurRad="38100" dist="38100" dir="2700000" algn="tl">
-                  <a:srgbClr val="000000">
-                    <a:alpha val="43137"/>
-                  </a:srgbClr>
-                </a:outerShdw>
-              </a:effectLst>
             </a:endParaRPr>
           </a:p>
         </p:txBody>
@@ -4424,8 +4722,8 @@
         </p:nvSpPr>
         <p:spPr>
           <a:xfrm>
-            <a:off x="4234050" y="3334486"/>
-            <a:ext cx="3199081" cy="369332"/>
+            <a:off x="4234050" y="3461570"/>
+            <a:ext cx="3436005" cy="369332"/>
           </a:xfrm>
           <a:prstGeom prst="rect">
             <a:avLst/>
@@ -4444,7 +4742,23 @@
                   <a:srgbClr val="FF0000"/>
                 </a:solidFill>
               </a:rPr>
-              <a:t>I clicked on “Manage Accounts”</a:t>
+              <a:t>Luke clicks</a:t>
+            </a:r>
+            <a:r>
+              <a:rPr lang="en-US" b="1" dirty="0" smtClean="0">
+                <a:solidFill>
+                  <a:srgbClr val="FF0000"/>
+                </a:solidFill>
+              </a:rPr>
+              <a:t> </a:t>
+            </a:r>
+            <a:r>
+              <a:rPr lang="en-US" b="1" dirty="0" smtClean="0">
+                <a:solidFill>
+                  <a:srgbClr val="FF0000"/>
+                </a:solidFill>
+              </a:rPr>
+              <a:t>on “Manage Accounts”</a:t>
             </a:r>
             <a:endParaRPr lang="en-US" b="1" dirty="0">
               <a:solidFill>
@@ -4463,7 +4777,7 @@
         <p:spPr>
           <a:xfrm>
             <a:off x="2820473" y="4752304"/>
-            <a:ext cx="4936801" cy="369332"/>
+            <a:ext cx="6830973" cy="369332"/>
           </a:xfrm>
           <a:prstGeom prst="rect">
             <a:avLst/>
@@ -4477,31 +4791,49 @@
           <a:lstStyle/>
           <a:p>
             <a:r>
+              <a:rPr lang="en-US" b="1" dirty="0">
+                <a:solidFill>
+                  <a:srgbClr val="FF0000"/>
+                </a:solidFill>
+              </a:rPr>
+              <a:t>Not yet implemented: clicking on a </a:t>
+            </a:r>
+            <a:r>
               <a:rPr lang="en-US" b="1" dirty="0" smtClean="0">
                 <a:solidFill>
                   <a:srgbClr val="FF0000"/>
                 </a:solidFill>
-                <a:effectLst>
-                  <a:outerShdw blurRad="38100" dist="38100" dir="2700000" algn="tl">
-                    <a:srgbClr val="000000">
-                      <a:alpha val="43137"/>
-                    </a:srgbClr>
-                  </a:outerShdw>
-                </a:effectLst>
               </a:rPr>
-              <a:t>Missing: after click in a name, go a editable profile</a:t>
+              <a:t>name goes </a:t>
+            </a:r>
+            <a:r>
+              <a:rPr lang="en-US" b="1" dirty="0">
+                <a:solidFill>
+                  <a:srgbClr val="FF0000"/>
+                </a:solidFill>
+              </a:rPr>
+              <a:t>to </a:t>
+            </a:r>
+            <a:r>
+              <a:rPr lang="en-US" b="1" dirty="0" smtClean="0">
+                <a:solidFill>
+                  <a:srgbClr val="FF0000"/>
+                </a:solidFill>
+              </a:rPr>
+              <a:t>an account edit </a:t>
+            </a:r>
+            <a:r>
+              <a:rPr lang="en-US" b="1" dirty="0">
+                <a:solidFill>
+                  <a:srgbClr val="FF0000"/>
+                </a:solidFill>
+              </a:rPr>
+              <a:t>page</a:t>
             </a:r>
             <a:endParaRPr lang="en-US" b="1" dirty="0">
               <a:solidFill>
                 <a:srgbClr val="FF0000"/>
               </a:solidFill>
-              <a:effectLst>
-                <a:outerShdw blurRad="38100" dist="38100" dir="2700000" algn="tl">
-                  <a:srgbClr val="000000">
-                    <a:alpha val="43137"/>
-                  </a:srgbClr>
-                </a:outerShdw>
-              </a:effectLst>
             </a:endParaRPr>
           </a:p>
         </p:txBody>
@@ -4569,7 +4901,7 @@
     </a:clrScheme>
     <a:fontScheme name="Escritório">
       <a:majorFont>
-        <a:latin typeface="Calibri Light" panose="020F0302020204030204"/>
+        <a:latin typeface="Calibri Light"/>
         <a:ea typeface=""/>
         <a:cs typeface=""/>
         <a:font script="Jpan" typeface="ＭＳ Ｐゴシック"/>
@@ -4604,7 +4936,7 @@
         <a:font script="Geor" typeface="Sylfaen"/>
       </a:majorFont>
       <a:minorFont>
-        <a:latin typeface="Calibri" panose="020F0502020204030204"/>
+        <a:latin typeface="Calibri"/>
         <a:ea typeface=""/>
         <a:cs typeface=""/>
         <a:font script="Jpan" typeface="ＭＳ Ｐゴシック"/>
@@ -4781,7 +5113,7 @@
   <a:extraClrSchemeLst/>
   <a:extLst>
     <a:ext uri="{05A4C25C-085E-4340-85A3-A5531E510DB2}">
-      <thm15:themeFamily xmlns:thm15="http://schemas.microsoft.com/office/thememl/2012/main" name="Office Theme" id="{62F939B6-93AF-4DB8-9C6B-D6C7DFDC589F}" vid="{4A3C46E8-61CC-4603-A589-7422A47A8E4A}"/>
+      <thm15:themeFamily xmlns:thm15="http://schemas.microsoft.com/office/thememl/2012/main" xmlns="" name="Office Theme" id="{62F939B6-93AF-4DB8-9C6B-D6C7DFDC589F}" vid="{4A3C46E8-61CC-4603-A589-7422A47A8E4A}"/>
     </a:ext>
   </a:extLst>
 </a:theme>

</xml_diff>

<commit_message>
Remove 'To Submit' and merge changes into 'done parts.'
Fellipe... we really need to talk about good naming and version control
conventions. If you want to make any more changes, please do them on the
same file and don't make new ones with a different name.
</commit_message>
<xml_diff>
--- a/done parts.pptx
+++ b/done parts.pptx
@@ -16,6 +16,12 @@
     <p:sldId id="264" r:id="rId10"/>
     <p:sldId id="265" r:id="rId11"/>
     <p:sldId id="266" r:id="rId12"/>
+    <p:sldId id="267" r:id="rId13"/>
+    <p:sldId id="268" r:id="rId14"/>
+    <p:sldId id="269" r:id="rId15"/>
+    <p:sldId id="270" r:id="rId16"/>
+    <p:sldId id="271" r:id="rId17"/>
+    <p:sldId id="272" r:id="rId18"/>
   </p:sldIdLst>
   <p:sldSz cx="12192000" cy="6858000"/>
   <p:notesSz cx="6858000" cy="9144000"/>
@@ -3074,11 +3080,6 @@
               </a:rPr>
               <a:t> logs in.</a:t>
             </a:r>
-            <a:endParaRPr lang="en-US" b="1" dirty="0" smtClean="0">
-              <a:solidFill>
-                <a:srgbClr val="FF0000"/>
-              </a:solidFill>
-            </a:endParaRPr>
           </a:p>
         </p:txBody>
       </p:sp>
@@ -3209,31 +3210,7 @@
                   <a:srgbClr val="FF0000"/>
                 </a:solidFill>
               </a:rPr>
-              <a:t>Luke clicks</a:t>
-            </a:r>
-            <a:r>
-              <a:rPr lang="en-US" b="1" dirty="0" smtClean="0">
-                <a:solidFill>
-                  <a:srgbClr val="FF0000"/>
-                </a:solidFill>
-              </a:rPr>
-              <a:t> </a:t>
-            </a:r>
-            <a:r>
-              <a:rPr lang="en-US" b="1" dirty="0" smtClean="0">
-                <a:solidFill>
-                  <a:srgbClr val="FF0000"/>
-                </a:solidFill>
-              </a:rPr>
-              <a:t>on “Create new </a:t>
-            </a:r>
-            <a:r>
-              <a:rPr lang="en-US" b="1" dirty="0" smtClean="0">
-                <a:solidFill>
-                  <a:srgbClr val="FF0000"/>
-                </a:solidFill>
-              </a:rPr>
-              <a:t>Account.” Now he can add a new employee, supervisor, or admin</a:t>
+              <a:t>Luke clicks on “Create new Account.” Now he can add a new employee, supervisor, or admin</a:t>
             </a:r>
             <a:endParaRPr lang="en-US" b="1" dirty="0">
               <a:solidFill>
@@ -3372,6 +3349,138 @@
               </a:rPr>
               <a:t>Confirmation page tells Luke it succeeded</a:t>
             </a:r>
+          </a:p>
+        </p:txBody>
+      </p:sp>
+    </p:spTree>
+    <p:extLst>
+      <p:ext uri="{BB962C8B-B14F-4D97-AF65-F5344CB8AC3E}">
+        <p14:creationId xmlns:p14="http://schemas.microsoft.com/office/powerpoint/2010/main" val="2688225314"/>
+      </p:ext>
+    </p:extLst>
+  </p:cSld>
+  <p:clrMapOvr>
+    <a:masterClrMapping/>
+  </p:clrMapOvr>
+  <p:timing>
+    <p:tnLst>
+      <p:par>
+        <p:cTn id="1" dur="indefinite" restart="never" nodeType="tmRoot"/>
+      </p:par>
+    </p:tnLst>
+  </p:timing>
+</p:sld>
+</file>
+
+<file path=ppt/slides/slide12.xml><?xml version="1.0" encoding="utf-8"?>
+<p:sld xmlns:a="http://schemas.openxmlformats.org/drawingml/2006/main" xmlns:r="http://schemas.openxmlformats.org/officeDocument/2006/relationships" xmlns:p="http://schemas.openxmlformats.org/presentationml/2006/main">
+  <p:cSld>
+    <p:spTree>
+      <p:nvGrpSpPr>
+        <p:cNvPr id="1" name=""/>
+        <p:cNvGrpSpPr/>
+        <p:nvPr/>
+      </p:nvGrpSpPr>
+      <p:grpSpPr>
+        <a:xfrm>
+          <a:off x="0" y="0"/>
+          <a:ext cx="0" cy="0"/>
+          <a:chOff x="0" y="0"/>
+          <a:chExt cx="0" cy="0"/>
+        </a:xfrm>
+      </p:grpSpPr>
+      <p:sp>
+        <p:nvSpPr>
+          <p:cNvPr id="2" name="Título 1"/>
+          <p:cNvSpPr>
+            <a:spLocks noGrp="1"/>
+          </p:cNvSpPr>
+          <p:nvPr>
+            <p:ph type="title"/>
+          </p:nvPr>
+        </p:nvSpPr>
+        <p:spPr/>
+        <p:txBody>
+          <a:bodyPr/>
+          <a:lstStyle/>
+          <a:p>
+            <a:endParaRPr lang="en-US"/>
+          </a:p>
+        </p:txBody>
+      </p:sp>
+      <p:sp>
+        <p:nvSpPr>
+          <p:cNvPr id="3" name="Espaço Reservado para Conteúdo 2"/>
+          <p:cNvSpPr>
+            <a:spLocks noGrp="1"/>
+          </p:cNvSpPr>
+          <p:nvPr>
+            <p:ph idx="1"/>
+          </p:nvPr>
+        </p:nvSpPr>
+        <p:spPr/>
+        <p:txBody>
+          <a:bodyPr/>
+          <a:lstStyle/>
+          <a:p>
+            <a:endParaRPr lang="en-US"/>
+          </a:p>
+        </p:txBody>
+      </p:sp>
+      <p:pic>
+        <p:nvPicPr>
+          <p:cNvPr id="4" name="Imagem 3"/>
+          <p:cNvPicPr>
+            <a:picLocks noChangeAspect="1"/>
+          </p:cNvPicPr>
+          <p:nvPr/>
+        </p:nvPicPr>
+        <p:blipFill>
+          <a:blip r:embed="rId2"/>
+          <a:stretch>
+            <a:fillRect/>
+          </a:stretch>
+        </p:blipFill>
+        <p:spPr>
+          <a:xfrm>
+            <a:off x="-409575" y="-228600"/>
+            <a:ext cx="13011150" cy="7315200"/>
+          </a:xfrm>
+          <a:prstGeom prst="rect">
+            <a:avLst/>
+          </a:prstGeom>
+        </p:spPr>
+      </p:pic>
+      <p:sp>
+        <p:nvSpPr>
+          <p:cNvPr id="5" name="CaixaDeTexto 4"/>
+          <p:cNvSpPr txBox="1"/>
+          <p:nvPr/>
+        </p:nvSpPr>
+        <p:spPr>
+          <a:xfrm>
+            <a:off x="8332631" y="4790941"/>
+            <a:ext cx="1394869" cy="369332"/>
+          </a:xfrm>
+          <a:prstGeom prst="rect">
+            <a:avLst/>
+          </a:prstGeom>
+          <a:noFill/>
+        </p:spPr>
+        <p:txBody>
+          <a:bodyPr wrap="none" rtlCol="0">
+            <a:spAutoFit/>
+          </a:bodyPr>
+          <a:lstStyle/>
+          <a:p>
+            <a:r>
+              <a:rPr lang="en-US" b="1" dirty="0" smtClean="0">
+                <a:solidFill>
+                  <a:srgbClr val="FF0000"/>
+                </a:solidFill>
+              </a:rPr>
+              <a:t>David logs in</a:t>
+            </a:r>
             <a:endParaRPr lang="en-US" b="1" dirty="0" smtClean="0">
               <a:solidFill>
                 <a:srgbClr val="FF0000"/>
@@ -3383,7 +3492,1000 @@
     </p:spTree>
     <p:extLst>
       <p:ext uri="{BB962C8B-B14F-4D97-AF65-F5344CB8AC3E}">
-        <p14:creationId xmlns:p14="http://schemas.microsoft.com/office/powerpoint/2010/main" val="2688225314"/>
+        <p14:creationId xmlns:p14="http://schemas.microsoft.com/office/powerpoint/2010/main" val="3243727631"/>
+      </p:ext>
+    </p:extLst>
+  </p:cSld>
+  <p:clrMapOvr>
+    <a:masterClrMapping/>
+  </p:clrMapOvr>
+  <p:timing>
+    <p:tnLst>
+      <p:par>
+        <p:cTn id="1" dur="indefinite" restart="never" nodeType="tmRoot"/>
+      </p:par>
+    </p:tnLst>
+  </p:timing>
+</p:sld>
+</file>
+
+<file path=ppt/slides/slide13.xml><?xml version="1.0" encoding="utf-8"?>
+<p:sld xmlns:a="http://schemas.openxmlformats.org/drawingml/2006/main" xmlns:r="http://schemas.openxmlformats.org/officeDocument/2006/relationships" xmlns:p="http://schemas.openxmlformats.org/presentationml/2006/main">
+  <p:cSld>
+    <p:spTree>
+      <p:nvGrpSpPr>
+        <p:cNvPr id="1" name=""/>
+        <p:cNvGrpSpPr/>
+        <p:nvPr/>
+      </p:nvGrpSpPr>
+      <p:grpSpPr>
+        <a:xfrm>
+          <a:off x="0" y="0"/>
+          <a:ext cx="0" cy="0"/>
+          <a:chOff x="0" y="0"/>
+          <a:chExt cx="0" cy="0"/>
+        </a:xfrm>
+      </p:grpSpPr>
+      <p:sp>
+        <p:nvSpPr>
+          <p:cNvPr id="2" name="Título 1"/>
+          <p:cNvSpPr>
+            <a:spLocks noGrp="1"/>
+          </p:cNvSpPr>
+          <p:nvPr>
+            <p:ph type="title"/>
+          </p:nvPr>
+        </p:nvSpPr>
+        <p:spPr/>
+        <p:txBody>
+          <a:bodyPr/>
+          <a:lstStyle/>
+          <a:p>
+            <a:endParaRPr lang="en-US"/>
+          </a:p>
+        </p:txBody>
+      </p:sp>
+      <p:sp>
+        <p:nvSpPr>
+          <p:cNvPr id="3" name="Espaço Reservado para Conteúdo 2"/>
+          <p:cNvSpPr>
+            <a:spLocks noGrp="1"/>
+          </p:cNvSpPr>
+          <p:nvPr>
+            <p:ph idx="1"/>
+          </p:nvPr>
+        </p:nvSpPr>
+        <p:spPr/>
+        <p:txBody>
+          <a:bodyPr/>
+          <a:lstStyle/>
+          <a:p>
+            <a:endParaRPr lang="en-US"/>
+          </a:p>
+        </p:txBody>
+      </p:sp>
+      <p:pic>
+        <p:nvPicPr>
+          <p:cNvPr id="4" name="Imagem 3"/>
+          <p:cNvPicPr>
+            <a:picLocks noChangeAspect="1"/>
+          </p:cNvPicPr>
+          <p:nvPr/>
+        </p:nvPicPr>
+        <p:blipFill>
+          <a:blip r:embed="rId2"/>
+          <a:stretch>
+            <a:fillRect/>
+          </a:stretch>
+        </p:blipFill>
+        <p:spPr>
+          <a:xfrm>
+            <a:off x="-409575" y="-228600"/>
+            <a:ext cx="13011150" cy="7315200"/>
+          </a:xfrm>
+          <a:prstGeom prst="rect">
+            <a:avLst/>
+          </a:prstGeom>
+        </p:spPr>
+      </p:pic>
+      <p:sp>
+        <p:nvSpPr>
+          <p:cNvPr id="5" name="Chave direita 4"/>
+          <p:cNvSpPr/>
+          <p:nvPr/>
+        </p:nvSpPr>
+        <p:spPr>
+          <a:xfrm>
+            <a:off x="2884868" y="4031087"/>
+            <a:ext cx="412124" cy="914400"/>
+          </a:xfrm>
+          <a:prstGeom prst="rightBrace">
+            <a:avLst/>
+          </a:prstGeom>
+          <a:ln w="38100"/>
+        </p:spPr>
+        <p:style>
+          <a:lnRef idx="1">
+            <a:schemeClr val="accent1"/>
+          </a:lnRef>
+          <a:fillRef idx="0">
+            <a:schemeClr val="accent1"/>
+          </a:fillRef>
+          <a:effectRef idx="0">
+            <a:schemeClr val="accent1"/>
+          </a:effectRef>
+          <a:fontRef idx="minor">
+            <a:schemeClr val="tx1"/>
+          </a:fontRef>
+        </p:style>
+        <p:txBody>
+          <a:bodyPr rtlCol="0" anchor="ctr"/>
+          <a:lstStyle/>
+          <a:p>
+            <a:pPr algn="ctr"/>
+            <a:endParaRPr lang="en-US"/>
+          </a:p>
+        </p:txBody>
+      </p:sp>
+      <p:sp>
+        <p:nvSpPr>
+          <p:cNvPr id="6" name="CaixaDeTexto 5"/>
+          <p:cNvSpPr txBox="1"/>
+          <p:nvPr/>
+        </p:nvSpPr>
+        <p:spPr>
+          <a:xfrm>
+            <a:off x="3696237" y="4303621"/>
+            <a:ext cx="5183727" cy="369332"/>
+          </a:xfrm>
+          <a:prstGeom prst="rect">
+            <a:avLst/>
+          </a:prstGeom>
+          <a:noFill/>
+        </p:spPr>
+        <p:txBody>
+          <a:bodyPr wrap="none" rtlCol="0">
+            <a:spAutoFit/>
+          </a:bodyPr>
+          <a:lstStyle/>
+          <a:p>
+            <a:r>
+              <a:rPr lang="en-US" b="1" dirty="0" smtClean="0">
+                <a:solidFill>
+                  <a:srgbClr val="FF0000"/>
+                </a:solidFill>
+              </a:rPr>
+              <a:t>List of projects that this employee is participating in.</a:t>
+            </a:r>
+            <a:endParaRPr lang="en-US" b="1" dirty="0">
+              <a:solidFill>
+                <a:srgbClr val="FF0000"/>
+              </a:solidFill>
+            </a:endParaRPr>
+          </a:p>
+        </p:txBody>
+      </p:sp>
+      <p:sp>
+        <p:nvSpPr>
+          <p:cNvPr id="7" name="Elipse 6"/>
+          <p:cNvSpPr/>
+          <p:nvPr/>
+        </p:nvSpPr>
+        <p:spPr>
+          <a:xfrm>
+            <a:off x="669701" y="4134118"/>
+            <a:ext cx="2060620" cy="367048"/>
+          </a:xfrm>
+          <a:prstGeom prst="ellipse">
+            <a:avLst/>
+          </a:prstGeom>
+          <a:noFill/>
+          <a:ln w="57150">
+            <a:solidFill>
+              <a:srgbClr val="92D050"/>
+            </a:solidFill>
+          </a:ln>
+        </p:spPr>
+        <p:style>
+          <a:lnRef idx="2">
+            <a:schemeClr val="accent1">
+              <a:shade val="50000"/>
+            </a:schemeClr>
+          </a:lnRef>
+          <a:fillRef idx="1">
+            <a:schemeClr val="accent1"/>
+          </a:fillRef>
+          <a:effectRef idx="0">
+            <a:schemeClr val="accent1"/>
+          </a:effectRef>
+          <a:fontRef idx="minor">
+            <a:schemeClr val="lt1"/>
+          </a:fontRef>
+        </p:style>
+        <p:txBody>
+          <a:bodyPr rtlCol="0" anchor="ctr"/>
+          <a:lstStyle/>
+          <a:p>
+            <a:pPr algn="ctr"/>
+            <a:endParaRPr lang="en-US"/>
+          </a:p>
+        </p:txBody>
+      </p:sp>
+      <p:sp>
+        <p:nvSpPr>
+          <p:cNvPr id="8" name="CaixaDeTexto 5"/>
+          <p:cNvSpPr txBox="1"/>
+          <p:nvPr/>
+        </p:nvSpPr>
+        <p:spPr>
+          <a:xfrm>
+            <a:off x="3848637" y="3592421"/>
+            <a:ext cx="6539547" cy="369332"/>
+          </a:xfrm>
+          <a:prstGeom prst="rect">
+            <a:avLst/>
+          </a:prstGeom>
+          <a:noFill/>
+        </p:spPr>
+        <p:txBody>
+          <a:bodyPr wrap="none" rtlCol="0">
+            <a:spAutoFit/>
+          </a:bodyPr>
+          <a:lstStyle/>
+          <a:p>
+            <a:r>
+              <a:rPr lang="en-US" b="1" dirty="0" smtClean="0">
+                <a:solidFill>
+                  <a:srgbClr val="FF0000"/>
+                </a:solidFill>
+              </a:rPr>
+              <a:t>David is an ordinary employee. He only sees his own open projects.</a:t>
+            </a:r>
+            <a:endParaRPr lang="en-US" b="1" dirty="0">
+              <a:solidFill>
+                <a:srgbClr val="FF0000"/>
+              </a:solidFill>
+            </a:endParaRPr>
+          </a:p>
+        </p:txBody>
+      </p:sp>
+    </p:spTree>
+    <p:extLst>
+      <p:ext uri="{BB962C8B-B14F-4D97-AF65-F5344CB8AC3E}">
+        <p14:creationId xmlns:p14="http://schemas.microsoft.com/office/powerpoint/2010/main" val="4197146509"/>
+      </p:ext>
+    </p:extLst>
+  </p:cSld>
+  <p:clrMapOvr>
+    <a:masterClrMapping/>
+  </p:clrMapOvr>
+  <p:timing>
+    <p:tnLst>
+      <p:par>
+        <p:cTn id="1" dur="indefinite" restart="never" nodeType="tmRoot"/>
+      </p:par>
+    </p:tnLst>
+  </p:timing>
+</p:sld>
+</file>
+
+<file path=ppt/slides/slide14.xml><?xml version="1.0" encoding="utf-8"?>
+<p:sld xmlns:a="http://schemas.openxmlformats.org/drawingml/2006/main" xmlns:r="http://schemas.openxmlformats.org/officeDocument/2006/relationships" xmlns:p="http://schemas.openxmlformats.org/presentationml/2006/main">
+  <p:cSld>
+    <p:spTree>
+      <p:nvGrpSpPr>
+        <p:cNvPr id="1" name=""/>
+        <p:cNvGrpSpPr/>
+        <p:nvPr/>
+      </p:nvGrpSpPr>
+      <p:grpSpPr>
+        <a:xfrm>
+          <a:off x="0" y="0"/>
+          <a:ext cx="0" cy="0"/>
+          <a:chOff x="0" y="0"/>
+          <a:chExt cx="0" cy="0"/>
+        </a:xfrm>
+      </p:grpSpPr>
+      <p:sp>
+        <p:nvSpPr>
+          <p:cNvPr id="2" name="Título 1"/>
+          <p:cNvSpPr>
+            <a:spLocks noGrp="1"/>
+          </p:cNvSpPr>
+          <p:nvPr>
+            <p:ph type="title"/>
+          </p:nvPr>
+        </p:nvSpPr>
+        <p:spPr/>
+        <p:txBody>
+          <a:bodyPr/>
+          <a:lstStyle/>
+          <a:p>
+            <a:endParaRPr lang="en-US"/>
+          </a:p>
+        </p:txBody>
+      </p:sp>
+      <p:sp>
+        <p:nvSpPr>
+          <p:cNvPr id="3" name="Espaço Reservado para Conteúdo 2"/>
+          <p:cNvSpPr>
+            <a:spLocks noGrp="1"/>
+          </p:cNvSpPr>
+          <p:nvPr>
+            <p:ph idx="1"/>
+          </p:nvPr>
+        </p:nvSpPr>
+        <p:spPr/>
+        <p:txBody>
+          <a:bodyPr/>
+          <a:lstStyle/>
+          <a:p>
+            <a:endParaRPr lang="en-US"/>
+          </a:p>
+        </p:txBody>
+      </p:sp>
+      <p:pic>
+        <p:nvPicPr>
+          <p:cNvPr id="4" name="Imagem 3"/>
+          <p:cNvPicPr>
+            <a:picLocks noChangeAspect="1"/>
+          </p:cNvPicPr>
+          <p:nvPr/>
+        </p:nvPicPr>
+        <p:blipFill>
+          <a:blip r:embed="rId2"/>
+          <a:stretch>
+            <a:fillRect/>
+          </a:stretch>
+        </p:blipFill>
+        <p:spPr>
+          <a:xfrm>
+            <a:off x="-409575" y="-228600"/>
+            <a:ext cx="13011150" cy="7315200"/>
+          </a:xfrm>
+          <a:prstGeom prst="rect">
+            <a:avLst/>
+          </a:prstGeom>
+        </p:spPr>
+      </p:pic>
+      <p:sp>
+        <p:nvSpPr>
+          <p:cNvPr id="5" name="Chave direita 4"/>
+          <p:cNvSpPr/>
+          <p:nvPr/>
+        </p:nvSpPr>
+        <p:spPr>
+          <a:xfrm>
+            <a:off x="2472746" y="4108360"/>
+            <a:ext cx="592428" cy="1171977"/>
+          </a:xfrm>
+          <a:prstGeom prst="rightBrace">
+            <a:avLst/>
+          </a:prstGeom>
+          <a:ln w="38100"/>
+        </p:spPr>
+        <p:style>
+          <a:lnRef idx="1">
+            <a:schemeClr val="accent1"/>
+          </a:lnRef>
+          <a:fillRef idx="0">
+            <a:schemeClr val="accent1"/>
+          </a:fillRef>
+          <a:effectRef idx="0">
+            <a:schemeClr val="accent1"/>
+          </a:effectRef>
+          <a:fontRef idx="minor">
+            <a:schemeClr val="tx1"/>
+          </a:fontRef>
+        </p:style>
+        <p:txBody>
+          <a:bodyPr rtlCol="0" anchor="ctr"/>
+          <a:lstStyle/>
+          <a:p>
+            <a:pPr algn="ctr"/>
+            <a:endParaRPr lang="en-US"/>
+          </a:p>
+        </p:txBody>
+      </p:sp>
+      <p:sp>
+        <p:nvSpPr>
+          <p:cNvPr id="6" name="CaixaDeTexto 5"/>
+          <p:cNvSpPr txBox="1"/>
+          <p:nvPr/>
+        </p:nvSpPr>
+        <p:spPr>
+          <a:xfrm>
+            <a:off x="3288893" y="4514045"/>
+            <a:ext cx="2613729" cy="369332"/>
+          </a:xfrm>
+          <a:prstGeom prst="rect">
+            <a:avLst/>
+          </a:prstGeom>
+          <a:noFill/>
+        </p:spPr>
+        <p:txBody>
+          <a:bodyPr wrap="none" rtlCol="0">
+            <a:spAutoFit/>
+          </a:bodyPr>
+          <a:lstStyle/>
+          <a:p>
+            <a:r>
+              <a:rPr lang="en-US" b="1" dirty="0" smtClean="0">
+                <a:solidFill>
+                  <a:srgbClr val="FF0000"/>
+                </a:solidFill>
+              </a:rPr>
+              <a:t>Peers in the same project</a:t>
+            </a:r>
+            <a:endParaRPr lang="en-US" b="1" dirty="0">
+              <a:solidFill>
+                <a:srgbClr val="FF0000"/>
+              </a:solidFill>
+            </a:endParaRPr>
+          </a:p>
+        </p:txBody>
+      </p:sp>
+      <p:sp>
+        <p:nvSpPr>
+          <p:cNvPr id="7" name="Elipse 6"/>
+          <p:cNvSpPr/>
+          <p:nvPr/>
+        </p:nvSpPr>
+        <p:spPr>
+          <a:xfrm>
+            <a:off x="451297" y="4146997"/>
+            <a:ext cx="2060620" cy="367048"/>
+          </a:xfrm>
+          <a:prstGeom prst="ellipse">
+            <a:avLst/>
+          </a:prstGeom>
+          <a:noFill/>
+          <a:ln w="57150">
+            <a:solidFill>
+              <a:srgbClr val="92D050"/>
+            </a:solidFill>
+          </a:ln>
+        </p:spPr>
+        <p:style>
+          <a:lnRef idx="2">
+            <a:schemeClr val="accent1">
+              <a:shade val="50000"/>
+            </a:schemeClr>
+          </a:lnRef>
+          <a:fillRef idx="1">
+            <a:schemeClr val="accent1"/>
+          </a:fillRef>
+          <a:effectRef idx="0">
+            <a:schemeClr val="accent1"/>
+          </a:effectRef>
+          <a:fontRef idx="minor">
+            <a:schemeClr val="lt1"/>
+          </a:fontRef>
+        </p:style>
+        <p:txBody>
+          <a:bodyPr rtlCol="0" anchor="ctr"/>
+          <a:lstStyle/>
+          <a:p>
+            <a:pPr algn="ctr"/>
+            <a:endParaRPr lang="en-US"/>
+          </a:p>
+        </p:txBody>
+      </p:sp>
+    </p:spTree>
+    <p:extLst>
+      <p:ext uri="{BB962C8B-B14F-4D97-AF65-F5344CB8AC3E}">
+        <p14:creationId xmlns:p14="http://schemas.microsoft.com/office/powerpoint/2010/main" val="224486443"/>
+      </p:ext>
+    </p:extLst>
+  </p:cSld>
+  <p:clrMapOvr>
+    <a:masterClrMapping/>
+  </p:clrMapOvr>
+  <p:timing>
+    <p:tnLst>
+      <p:par>
+        <p:cTn id="1" dur="indefinite" restart="never" nodeType="tmRoot"/>
+      </p:par>
+    </p:tnLst>
+  </p:timing>
+</p:sld>
+</file>
+
+<file path=ppt/slides/slide15.xml><?xml version="1.0" encoding="utf-8"?>
+<p:sld xmlns:a="http://schemas.openxmlformats.org/drawingml/2006/main" xmlns:r="http://schemas.openxmlformats.org/officeDocument/2006/relationships" xmlns:p="http://schemas.openxmlformats.org/presentationml/2006/main">
+  <p:cSld>
+    <p:spTree>
+      <p:nvGrpSpPr>
+        <p:cNvPr id="1" name=""/>
+        <p:cNvGrpSpPr/>
+        <p:nvPr/>
+      </p:nvGrpSpPr>
+      <p:grpSpPr>
+        <a:xfrm>
+          <a:off x="0" y="0"/>
+          <a:ext cx="0" cy="0"/>
+          <a:chOff x="0" y="0"/>
+          <a:chExt cx="0" cy="0"/>
+        </a:xfrm>
+      </p:grpSpPr>
+      <p:sp>
+        <p:nvSpPr>
+          <p:cNvPr id="2" name="Título 1"/>
+          <p:cNvSpPr>
+            <a:spLocks noGrp="1"/>
+          </p:cNvSpPr>
+          <p:nvPr>
+            <p:ph type="title"/>
+          </p:nvPr>
+        </p:nvSpPr>
+        <p:spPr/>
+        <p:txBody>
+          <a:bodyPr/>
+          <a:lstStyle/>
+          <a:p>
+            <a:endParaRPr lang="en-US"/>
+          </a:p>
+        </p:txBody>
+      </p:sp>
+      <p:sp>
+        <p:nvSpPr>
+          <p:cNvPr id="3" name="Espaço Reservado para Conteúdo 2"/>
+          <p:cNvSpPr>
+            <a:spLocks noGrp="1"/>
+          </p:cNvSpPr>
+          <p:nvPr>
+            <p:ph idx="1"/>
+          </p:nvPr>
+        </p:nvSpPr>
+        <p:spPr/>
+        <p:txBody>
+          <a:bodyPr/>
+          <a:lstStyle/>
+          <a:p>
+            <a:endParaRPr lang="en-US"/>
+          </a:p>
+        </p:txBody>
+      </p:sp>
+      <p:pic>
+        <p:nvPicPr>
+          <p:cNvPr id="5" name="Imagem 4"/>
+          <p:cNvPicPr>
+            <a:picLocks noChangeAspect="1"/>
+          </p:cNvPicPr>
+          <p:nvPr/>
+        </p:nvPicPr>
+        <p:blipFill>
+          <a:blip r:embed="rId2"/>
+          <a:stretch>
+            <a:fillRect/>
+          </a:stretch>
+        </p:blipFill>
+        <p:spPr>
+          <a:xfrm>
+            <a:off x="-409575" y="-228600"/>
+            <a:ext cx="13011150" cy="7315200"/>
+          </a:xfrm>
+          <a:prstGeom prst="rect">
+            <a:avLst/>
+          </a:prstGeom>
+        </p:spPr>
+      </p:pic>
+      <p:sp>
+        <p:nvSpPr>
+          <p:cNvPr id="6" name="CaixaDeTexto 5"/>
+          <p:cNvSpPr txBox="1"/>
+          <p:nvPr/>
+        </p:nvSpPr>
+        <p:spPr>
+          <a:xfrm>
+            <a:off x="3696237" y="442821"/>
+            <a:ext cx="2939331" cy="369332"/>
+          </a:xfrm>
+          <a:prstGeom prst="rect">
+            <a:avLst/>
+          </a:prstGeom>
+          <a:noFill/>
+        </p:spPr>
+        <p:txBody>
+          <a:bodyPr wrap="none" rtlCol="0">
+            <a:spAutoFit/>
+          </a:bodyPr>
+          <a:lstStyle/>
+          <a:p>
+            <a:r>
+              <a:rPr lang="en-US" b="1" dirty="0" smtClean="0">
+                <a:solidFill>
+                  <a:srgbClr val="FF0000"/>
+                </a:solidFill>
+              </a:rPr>
+              <a:t>David can evaluate his peers.</a:t>
+            </a:r>
+            <a:endParaRPr lang="en-US" b="1" dirty="0">
+              <a:solidFill>
+                <a:srgbClr val="FF0000"/>
+              </a:solidFill>
+            </a:endParaRPr>
+          </a:p>
+        </p:txBody>
+      </p:sp>
+    </p:spTree>
+    <p:extLst>
+      <p:ext uri="{BB962C8B-B14F-4D97-AF65-F5344CB8AC3E}">
+        <p14:creationId xmlns:p14="http://schemas.microsoft.com/office/powerpoint/2010/main" val="1404399831"/>
+      </p:ext>
+    </p:extLst>
+  </p:cSld>
+  <p:clrMapOvr>
+    <a:masterClrMapping/>
+  </p:clrMapOvr>
+  <p:timing>
+    <p:tnLst>
+      <p:par>
+        <p:cTn id="1" dur="indefinite" restart="never" nodeType="tmRoot"/>
+      </p:par>
+    </p:tnLst>
+  </p:timing>
+</p:sld>
+</file>
+
+<file path=ppt/slides/slide16.xml><?xml version="1.0" encoding="utf-8"?>
+<p:sld xmlns:a="http://schemas.openxmlformats.org/drawingml/2006/main" xmlns:r="http://schemas.openxmlformats.org/officeDocument/2006/relationships" xmlns:p="http://schemas.openxmlformats.org/presentationml/2006/main">
+  <p:cSld>
+    <p:spTree>
+      <p:nvGrpSpPr>
+        <p:cNvPr id="1" name=""/>
+        <p:cNvGrpSpPr/>
+        <p:nvPr/>
+      </p:nvGrpSpPr>
+      <p:grpSpPr>
+        <a:xfrm>
+          <a:off x="0" y="0"/>
+          <a:ext cx="0" cy="0"/>
+          <a:chOff x="0" y="0"/>
+          <a:chExt cx="0" cy="0"/>
+        </a:xfrm>
+      </p:grpSpPr>
+      <p:sp>
+        <p:nvSpPr>
+          <p:cNvPr id="2" name="Título 1"/>
+          <p:cNvSpPr>
+            <a:spLocks noGrp="1"/>
+          </p:cNvSpPr>
+          <p:nvPr>
+            <p:ph type="title"/>
+          </p:nvPr>
+        </p:nvSpPr>
+        <p:spPr/>
+        <p:txBody>
+          <a:bodyPr/>
+          <a:lstStyle/>
+          <a:p>
+            <a:endParaRPr lang="en-US"/>
+          </a:p>
+        </p:txBody>
+      </p:sp>
+      <p:sp>
+        <p:nvSpPr>
+          <p:cNvPr id="3" name="Espaço Reservado para Conteúdo 2"/>
+          <p:cNvSpPr>
+            <a:spLocks noGrp="1"/>
+          </p:cNvSpPr>
+          <p:nvPr>
+            <p:ph idx="1"/>
+          </p:nvPr>
+        </p:nvSpPr>
+        <p:spPr/>
+        <p:txBody>
+          <a:bodyPr/>
+          <a:lstStyle/>
+          <a:p>
+            <a:endParaRPr lang="en-US"/>
+          </a:p>
+        </p:txBody>
+      </p:sp>
+      <p:pic>
+        <p:nvPicPr>
+          <p:cNvPr id="4" name="Imagem 3"/>
+          <p:cNvPicPr>
+            <a:picLocks noChangeAspect="1"/>
+          </p:cNvPicPr>
+          <p:nvPr/>
+        </p:nvPicPr>
+        <p:blipFill>
+          <a:blip r:embed="rId2"/>
+          <a:stretch>
+            <a:fillRect/>
+          </a:stretch>
+        </p:blipFill>
+        <p:spPr>
+          <a:xfrm>
+            <a:off x="-409575" y="-228600"/>
+            <a:ext cx="13011150" cy="7315200"/>
+          </a:xfrm>
+          <a:prstGeom prst="rect">
+            <a:avLst/>
+          </a:prstGeom>
+        </p:spPr>
+      </p:pic>
+      <p:sp>
+        <p:nvSpPr>
+          <p:cNvPr id="5" name="Elipse 4"/>
+          <p:cNvSpPr/>
+          <p:nvPr/>
+        </p:nvSpPr>
+        <p:spPr>
+          <a:xfrm>
+            <a:off x="476518" y="5537915"/>
+            <a:ext cx="1197736" cy="978794"/>
+          </a:xfrm>
+          <a:prstGeom prst="ellipse">
+            <a:avLst/>
+          </a:prstGeom>
+          <a:noFill/>
+          <a:ln w="76200">
+            <a:solidFill>
+              <a:srgbClr val="92D050"/>
+            </a:solidFill>
+          </a:ln>
+        </p:spPr>
+        <p:style>
+          <a:lnRef idx="2">
+            <a:schemeClr val="accent1">
+              <a:shade val="50000"/>
+            </a:schemeClr>
+          </a:lnRef>
+          <a:fillRef idx="1">
+            <a:schemeClr val="accent1"/>
+          </a:fillRef>
+          <a:effectRef idx="0">
+            <a:schemeClr val="accent1"/>
+          </a:effectRef>
+          <a:fontRef idx="minor">
+            <a:schemeClr val="lt1"/>
+          </a:fontRef>
+        </p:style>
+        <p:txBody>
+          <a:bodyPr rtlCol="0" anchor="ctr"/>
+          <a:lstStyle/>
+          <a:p>
+            <a:pPr algn="ctr"/>
+            <a:endParaRPr lang="en-US"/>
+          </a:p>
+        </p:txBody>
+      </p:sp>
+      <p:sp>
+        <p:nvSpPr>
+          <p:cNvPr id="6" name="CaixaDeTexto 5"/>
+          <p:cNvSpPr txBox="1"/>
+          <p:nvPr/>
+        </p:nvSpPr>
+        <p:spPr>
+          <a:xfrm>
+            <a:off x="2121437" y="5842646"/>
+            <a:ext cx="3029676" cy="369332"/>
+          </a:xfrm>
+          <a:prstGeom prst="rect">
+            <a:avLst/>
+          </a:prstGeom>
+          <a:noFill/>
+        </p:spPr>
+        <p:txBody>
+          <a:bodyPr wrap="none" rtlCol="0">
+            <a:spAutoFit/>
+          </a:bodyPr>
+          <a:lstStyle/>
+          <a:p>
+            <a:r>
+              <a:rPr lang="en-US" b="1" dirty="0" smtClean="0">
+                <a:solidFill>
+                  <a:srgbClr val="FF0000"/>
+                </a:solidFill>
+              </a:rPr>
+              <a:t>David submits </a:t>
+            </a:r>
+            <a:r>
+              <a:rPr lang="en-US" b="1" smtClean="0">
+                <a:solidFill>
+                  <a:srgbClr val="FF0000"/>
+                </a:solidFill>
+              </a:rPr>
+              <a:t>the evaluation.</a:t>
+            </a:r>
+            <a:endParaRPr lang="en-US" b="1" dirty="0">
+              <a:solidFill>
+                <a:srgbClr val="FF0000"/>
+              </a:solidFill>
+            </a:endParaRPr>
+          </a:p>
+        </p:txBody>
+      </p:sp>
+    </p:spTree>
+    <p:extLst>
+      <p:ext uri="{BB962C8B-B14F-4D97-AF65-F5344CB8AC3E}">
+        <p14:creationId xmlns:p14="http://schemas.microsoft.com/office/powerpoint/2010/main" val="3110936068"/>
+      </p:ext>
+    </p:extLst>
+  </p:cSld>
+  <p:clrMapOvr>
+    <a:masterClrMapping/>
+  </p:clrMapOvr>
+  <p:timing>
+    <p:tnLst>
+      <p:par>
+        <p:cTn id="1" dur="indefinite" restart="never" nodeType="tmRoot"/>
+      </p:par>
+    </p:tnLst>
+  </p:timing>
+</p:sld>
+</file>
+
+<file path=ppt/slides/slide17.xml><?xml version="1.0" encoding="utf-8"?>
+<p:sld xmlns:a="http://schemas.openxmlformats.org/drawingml/2006/main" xmlns:r="http://schemas.openxmlformats.org/officeDocument/2006/relationships" xmlns:p="http://schemas.openxmlformats.org/presentationml/2006/main">
+  <p:cSld>
+    <p:spTree>
+      <p:nvGrpSpPr>
+        <p:cNvPr id="1" name=""/>
+        <p:cNvGrpSpPr/>
+        <p:nvPr/>
+      </p:nvGrpSpPr>
+      <p:grpSpPr>
+        <a:xfrm>
+          <a:off x="0" y="0"/>
+          <a:ext cx="0" cy="0"/>
+          <a:chOff x="0" y="0"/>
+          <a:chExt cx="0" cy="0"/>
+        </a:xfrm>
+      </p:grpSpPr>
+      <p:sp>
+        <p:nvSpPr>
+          <p:cNvPr id="2" name="Título 1"/>
+          <p:cNvSpPr>
+            <a:spLocks noGrp="1"/>
+          </p:cNvSpPr>
+          <p:nvPr>
+            <p:ph type="title"/>
+          </p:nvPr>
+        </p:nvSpPr>
+        <p:spPr/>
+        <p:txBody>
+          <a:bodyPr/>
+          <a:lstStyle/>
+          <a:p>
+            <a:endParaRPr lang="en-US"/>
+          </a:p>
+        </p:txBody>
+      </p:sp>
+      <p:sp>
+        <p:nvSpPr>
+          <p:cNvPr id="3" name="Espaço Reservado para Conteúdo 2"/>
+          <p:cNvSpPr>
+            <a:spLocks noGrp="1"/>
+          </p:cNvSpPr>
+          <p:nvPr>
+            <p:ph idx="1"/>
+          </p:nvPr>
+        </p:nvSpPr>
+        <p:spPr/>
+        <p:txBody>
+          <a:bodyPr/>
+          <a:lstStyle/>
+          <a:p>
+            <a:endParaRPr lang="en-US"/>
+          </a:p>
+        </p:txBody>
+      </p:sp>
+      <p:pic>
+        <p:nvPicPr>
+          <p:cNvPr id="4" name="Imagem 3"/>
+          <p:cNvPicPr>
+            <a:picLocks noChangeAspect="1"/>
+          </p:cNvPicPr>
+          <p:nvPr/>
+        </p:nvPicPr>
+        <p:blipFill>
+          <a:blip r:embed="rId2"/>
+          <a:stretch>
+            <a:fillRect/>
+          </a:stretch>
+        </p:blipFill>
+        <p:spPr>
+          <a:xfrm>
+            <a:off x="-409575" y="-228600"/>
+            <a:ext cx="13011150" cy="7315200"/>
+          </a:xfrm>
+          <a:prstGeom prst="rect">
+            <a:avLst/>
+          </a:prstGeom>
+        </p:spPr>
+      </p:pic>
+      <p:sp>
+        <p:nvSpPr>
+          <p:cNvPr id="5" name="Elipse 4"/>
+          <p:cNvSpPr/>
+          <p:nvPr/>
+        </p:nvSpPr>
+        <p:spPr>
+          <a:xfrm>
+            <a:off x="10947042" y="4018208"/>
+            <a:ext cx="695459" cy="579550"/>
+          </a:xfrm>
+          <a:prstGeom prst="ellipse">
+            <a:avLst/>
+          </a:prstGeom>
+          <a:noFill/>
+          <a:ln w="76200">
+            <a:solidFill>
+              <a:schemeClr val="accent6"/>
+            </a:solidFill>
+          </a:ln>
+        </p:spPr>
+        <p:style>
+          <a:lnRef idx="2">
+            <a:schemeClr val="accent1">
+              <a:shade val="50000"/>
+            </a:schemeClr>
+          </a:lnRef>
+          <a:fillRef idx="1">
+            <a:schemeClr val="accent1"/>
+          </a:fillRef>
+          <a:effectRef idx="0">
+            <a:schemeClr val="accent1"/>
+          </a:effectRef>
+          <a:fontRef idx="minor">
+            <a:schemeClr val="lt1"/>
+          </a:fontRef>
+        </p:style>
+        <p:txBody>
+          <a:bodyPr rtlCol="0" anchor="ctr"/>
+          <a:lstStyle/>
+          <a:p>
+            <a:pPr algn="ctr"/>
+            <a:endParaRPr lang="en-US"/>
+          </a:p>
+        </p:txBody>
+      </p:sp>
+      <p:sp>
+        <p:nvSpPr>
+          <p:cNvPr id="6" name="CaixaDeTexto 5"/>
+          <p:cNvSpPr txBox="1"/>
+          <p:nvPr/>
+        </p:nvSpPr>
+        <p:spPr>
+          <a:xfrm>
+            <a:off x="5917484" y="4065857"/>
+            <a:ext cx="4222631" cy="369332"/>
+          </a:xfrm>
+          <a:prstGeom prst="rect">
+            <a:avLst/>
+          </a:prstGeom>
+          <a:noFill/>
+        </p:spPr>
+        <p:txBody>
+          <a:bodyPr wrap="none" rtlCol="0">
+            <a:spAutoFit/>
+          </a:bodyPr>
+          <a:lstStyle/>
+          <a:p>
+            <a:r>
+              <a:rPr lang="en-US" b="1" dirty="0" smtClean="0">
+                <a:solidFill>
+                  <a:srgbClr val="FF0000"/>
+                </a:solidFill>
+              </a:rPr>
+              <a:t>David sees that the evaluation is complete</a:t>
+            </a:r>
+            <a:endParaRPr lang="en-US" b="1" dirty="0">
+              <a:solidFill>
+                <a:srgbClr val="FF0000"/>
+              </a:solidFill>
+            </a:endParaRPr>
+          </a:p>
+        </p:txBody>
+      </p:sp>
+    </p:spTree>
+    <p:extLst>
+      <p:ext uri="{BB962C8B-B14F-4D97-AF65-F5344CB8AC3E}">
+        <p14:creationId xmlns:p14="http://schemas.microsoft.com/office/powerpoint/2010/main" val="234571788"/>
       </p:ext>
     </p:extLst>
   </p:cSld>
@@ -3585,11 +4687,6 @@
               </a:rPr>
               <a:t> is a supervisor</a:t>
             </a:r>
-            <a:endParaRPr lang="en-US" b="1" dirty="0" smtClean="0">
-              <a:solidFill>
-                <a:srgbClr val="FF0000"/>
-              </a:solidFill>
-            </a:endParaRPr>
           </a:p>
         </p:txBody>
       </p:sp>
@@ -3720,47 +4817,7 @@
                   <a:srgbClr val="FF0000"/>
                 </a:solidFill>
               </a:rPr>
-              <a:t>Not yet implemented: </a:t>
-            </a:r>
-            <a:r>
-              <a:rPr lang="en-US" b="1" dirty="0" smtClean="0">
-                <a:solidFill>
-                  <a:srgbClr val="FF0000"/>
-                </a:solidFill>
-              </a:rPr>
-              <a:t>list the</a:t>
-            </a:r>
-            <a:r>
-              <a:rPr lang="en-US" b="1" dirty="0" smtClean="0">
-                <a:solidFill>
-                  <a:srgbClr val="FF0000"/>
-                </a:solidFill>
-              </a:rPr>
-              <a:t> </a:t>
-            </a:r>
-            <a:r>
-              <a:rPr lang="en-US" b="1" dirty="0" smtClean="0">
-                <a:solidFill>
-                  <a:srgbClr val="FF0000"/>
-                </a:solidFill>
-              </a:rPr>
-              <a:t>employees </a:t>
-            </a:r>
-            <a:r>
-              <a:rPr lang="en-US" b="1" dirty="0" smtClean="0">
-                <a:solidFill>
-                  <a:srgbClr val="FF0000"/>
-                </a:solidFill>
-              </a:rPr>
-              <a:t>working on </a:t>
-            </a:r>
-            <a:r>
-              <a:rPr lang="en-US" b="1" dirty="0" smtClean="0">
-                <a:solidFill>
-                  <a:srgbClr val="FF0000"/>
-                </a:solidFill>
-              </a:rPr>
-              <a:t>the project</a:t>
+              <a:t>Not yet implemented: list the employees working on the project</a:t>
             </a:r>
           </a:p>
         </p:txBody>
@@ -3943,11 +5000,6 @@
               </a:rPr>
               <a:t> clicks create</a:t>
             </a:r>
-            <a:endParaRPr lang="en-US" b="1" dirty="0" smtClean="0">
-              <a:solidFill>
-                <a:srgbClr val="FF0000"/>
-              </a:solidFill>
-            </a:endParaRPr>
           </a:p>
         </p:txBody>
       </p:sp>
@@ -4096,11 +5148,6 @@
               </a:rPr>
               <a:t> it succeeded</a:t>
             </a:r>
-            <a:endParaRPr lang="en-US" b="1" dirty="0" smtClean="0">
-              <a:solidFill>
-                <a:srgbClr val="FF0000"/>
-              </a:solidFill>
-            </a:endParaRPr>
           </a:p>
         </p:txBody>
       </p:sp>
@@ -4231,21 +5278,8 @@
                   <a:srgbClr val="FF0000"/>
                 </a:solidFill>
               </a:rPr>
-              <a:t>Luke </a:t>
-            </a:r>
-            <a:r>
-              <a:rPr lang="en-US" b="1" dirty="0" smtClean="0">
-                <a:solidFill>
-                  <a:srgbClr val="FF0000"/>
-                </a:solidFill>
-              </a:rPr>
-              <a:t>logs in.</a:t>
-            </a:r>
-            <a:endParaRPr lang="en-US" b="1" dirty="0" smtClean="0">
-              <a:solidFill>
-                <a:srgbClr val="FF0000"/>
-              </a:solidFill>
-            </a:endParaRPr>
+              <a:t>Luke logs in.</a:t>
+            </a:r>
           </a:p>
         </p:txBody>
       </p:sp>
@@ -4378,11 +5412,6 @@
               </a:rPr>
               <a:t>Luke can manage projects and accounts from his home page</a:t>
             </a:r>
-            <a:endParaRPr lang="en-US" b="1" dirty="0" smtClean="0">
-              <a:solidFill>
-                <a:srgbClr val="FF0000"/>
-              </a:solidFill>
-            </a:endParaRPr>
           </a:p>
         </p:txBody>
       </p:sp>
@@ -4416,11 +5445,6 @@
               </a:rPr>
               <a:t>Luke is an admin</a:t>
             </a:r>
-            <a:endParaRPr lang="en-US" b="1" dirty="0" smtClean="0">
-              <a:solidFill>
-                <a:srgbClr val="FF0000"/>
-              </a:solidFill>
-            </a:endParaRPr>
           </a:p>
         </p:txBody>
       </p:sp>
@@ -4551,23 +5575,7 @@
                   <a:srgbClr val="FF0000"/>
                 </a:solidFill>
               </a:rPr>
-              <a:t>He clicks </a:t>
-            </a:r>
-            <a:r>
-              <a:rPr lang="en-US" b="1" dirty="0" smtClean="0">
-                <a:solidFill>
-                  <a:srgbClr val="FF0000"/>
-                </a:solidFill>
-              </a:rPr>
-              <a:t>on </a:t>
-            </a:r>
-            <a:r>
-              <a:rPr lang="en-US" b="1" dirty="0" smtClean="0">
-                <a:solidFill>
-                  <a:srgbClr val="FF0000"/>
-                </a:solidFill>
-              </a:rPr>
-              <a:t>“Manage Projects”</a:t>
+              <a:t>He clicks on “Manage Projects”</a:t>
             </a:r>
             <a:endParaRPr lang="en-US" b="1" dirty="0">
               <a:solidFill>
@@ -4742,23 +5750,7 @@
                   <a:srgbClr val="FF0000"/>
                 </a:solidFill>
               </a:rPr>
-              <a:t>Luke clicks</a:t>
-            </a:r>
-            <a:r>
-              <a:rPr lang="en-US" b="1" dirty="0" smtClean="0">
-                <a:solidFill>
-                  <a:srgbClr val="FF0000"/>
-                </a:solidFill>
-              </a:rPr>
-              <a:t> </a:t>
-            </a:r>
-            <a:r>
-              <a:rPr lang="en-US" b="1" dirty="0" smtClean="0">
-                <a:solidFill>
-                  <a:srgbClr val="FF0000"/>
-                </a:solidFill>
-              </a:rPr>
-              <a:t>on “Manage Accounts”</a:t>
+              <a:t>Luke clicks on “Manage Accounts”</a:t>
             </a:r>
             <a:endParaRPr lang="en-US" b="1" dirty="0">
               <a:solidFill>
@@ -4830,11 +5822,6 @@
               </a:rPr>
               <a:t>page</a:t>
             </a:r>
-            <a:endParaRPr lang="en-US" b="1" dirty="0">
-              <a:solidFill>
-                <a:srgbClr val="FF0000"/>
-              </a:solidFill>
-            </a:endParaRPr>
           </a:p>
         </p:txBody>
       </p:sp>
@@ -5113,7 +6100,7 @@
   <a:extraClrSchemeLst/>
   <a:extLst>
     <a:ext uri="{05A4C25C-085E-4340-85A3-A5531E510DB2}">
-      <thm15:themeFamily xmlns:thm15="http://schemas.microsoft.com/office/thememl/2012/main" xmlns="" name="Office Theme" id="{62F939B6-93AF-4DB8-9C6B-D6C7DFDC589F}" vid="{4A3C46E8-61CC-4603-A589-7422A47A8E4A}"/>
+      <thm15:themeFamily xmlns="" xmlns:thm15="http://schemas.microsoft.com/office/thememl/2012/main" name="Office Theme" id="{62F939B6-93AF-4DB8-9C6B-D6C7DFDC589F}" vid="{4A3C46E8-61CC-4603-A589-7422A47A8E4A}"/>
     </a:ext>
   </a:extLst>
 </a:theme>

</xml_diff>